<commit_message>
9th push, powerpoint done, pending alignment of ipynb and creation of dashboard and editing the readme files
</commit_message>
<xml_diff>
--- a/CAPITAL INVESTMENTS LIMITED.pptx
+++ b/CAPITAL INVESTMENTS LIMITED.pptx
@@ -20712,8 +20712,12 @@
           <a:lstStyle/>
           <a:p>
             <a:r>
-              <a:rPr lang="en-US" dirty="0" err="1" smtClean="0"/>
-              <a:t>Conclusion,Recommendations</a:t>
+              <a:rPr lang="en-US" dirty="0" smtClean="0"/>
+              <a:t>Conclusion</a:t>
+            </a:r>
+            <a:r>
+              <a:rPr lang="en-US" dirty="0" smtClean="0"/>
+              <a:t>, Recommendations</a:t>
             </a:r>
             <a:r>
               <a:rPr lang="en-US" dirty="0" smtClean="0"/>
@@ -20738,6 +20742,29 @@
           <a:bodyPr/>
           <a:lstStyle/>
           <a:p>
+            <a:r>
+              <a:rPr lang="en-US" dirty="0" smtClean="0"/>
+              <a:t>The data is very significant and shows an interesting trend of where helicopters tend to take more damage on average in comparison to aircraft.</a:t>
+            </a:r>
+          </a:p>
+          <a:p>
+            <a:r>
+              <a:rPr lang="en-US" dirty="0" smtClean="0"/>
+              <a:t>This however doesn’t stop us, as we earlier saw, the ratio of destruction in comparison to substantial damage is quite low roughly 20%-25%.</a:t>
+            </a:r>
+          </a:p>
+          <a:p>
+            <a:endParaRPr lang="en-US" dirty="0"/>
+          </a:p>
+          <a:p>
+            <a:r>
+              <a:rPr lang="en-US" dirty="0" smtClean="0"/>
+              <a:t>The idea seems quite good and as such we should proceed with the idea less, the Makes of planes mentioned in the slides as they </a:t>
+            </a:r>
+            <a:r>
+              <a:rPr lang="en-US" smtClean="0"/>
+              <a:t>seem chaotic.</a:t>
+            </a:r>
             <a:endParaRPr lang="en-US" dirty="0"/>
           </a:p>
         </p:txBody>
@@ -21133,7 +21160,7 @@
         <p:spPr>
           <a:xfrm>
             <a:off x="7438292" y="1556238"/>
-            <a:ext cx="3915508" cy="646331"/>
+            <a:ext cx="3915508" cy="2585323"/>
           </a:xfrm>
           <a:prstGeom prst="rect">
             <a:avLst/>
@@ -21148,13 +21175,20 @@
           <a:p>
             <a:r>
               <a:rPr lang="en-US" dirty="0" smtClean="0"/>
-              <a:t>Explanation.</a:t>
+              <a:t>As we can see from the graph here, Airplanes are relatively safe with less than 20% of fatal accidents resulting in destruction of th</a:t>
             </a:r>
+            <a:r>
+              <a:rPr lang="en-US" dirty="0" smtClean="0"/>
+              <a:t>e airplane. </a:t>
+            </a:r>
+          </a:p>
+          <a:p>
+            <a:endParaRPr lang="en-US" dirty="0"/>
           </a:p>
           <a:p>
             <a:r>
               <a:rPr lang="en-US" dirty="0" smtClean="0"/>
-              <a:t>box</a:t>
+              <a:t>As such, this negates fears in the airplane type and we can now proceed to delve in further to the various makes that formed the data.</a:t>
             </a:r>
             <a:endParaRPr lang="en-US" dirty="0"/>
           </a:p>
@@ -21262,7 +21296,7 @@
         </p:nvGraphicFramePr>
         <p:xfrm>
           <a:off x="6031522" y="940779"/>
-          <a:ext cx="5589493" cy="3448495"/>
+          <a:ext cx="5589493" cy="3587758"/>
         </p:xfrm>
         <a:graphic>
           <a:graphicData uri="http://schemas.openxmlformats.org/drawingml/2006/table">
@@ -23844,7 +23878,7 @@
         <p:spPr>
           <a:xfrm>
             <a:off x="6022731" y="4545623"/>
-            <a:ext cx="5776546" cy="923330"/>
+            <a:ext cx="5776546" cy="1754326"/>
           </a:xfrm>
           <a:prstGeom prst="rect">
             <a:avLst/>
@@ -23859,14 +23893,9 @@
           <a:p>
             <a:r>
               <a:rPr lang="en-US" dirty="0" smtClean="0"/>
-              <a:t>Additional info</a:t>
+              <a:t>As it would appear, the worst accidents occurred in Cessna, followed by Piper and Beech. As such these type of brands would be best avoided. As the table has been split, I advise we proceed with the brands on the right hand side due to low incidence of occurrence.</a:t>
             </a:r>
-          </a:p>
-          <a:p>
-            <a:r>
-              <a:rPr lang="en-US" dirty="0" smtClean="0"/>
-              <a:t>Box</a:t>
-            </a:r>
+            <a:endParaRPr lang="en-US" dirty="0" smtClean="0"/>
           </a:p>
           <a:p>
             <a:endParaRPr lang="en-US" dirty="0"/>
@@ -23975,7 +24004,7 @@
         </p:nvGraphicFramePr>
         <p:xfrm>
           <a:off x="5275385" y="738554"/>
-          <a:ext cx="6743700" cy="3456688"/>
+          <a:ext cx="6743700" cy="3587756"/>
         </p:xfrm>
         <a:graphic>
           <a:graphicData uri="http://schemas.openxmlformats.org/drawingml/2006/table">
@@ -26384,7 +26413,7 @@
         <p:spPr>
           <a:xfrm>
             <a:off x="5275385" y="4334608"/>
-            <a:ext cx="6682153" cy="646331"/>
+            <a:ext cx="6682153" cy="1477328"/>
           </a:xfrm>
           <a:prstGeom prst="rect">
             <a:avLst/>
@@ -26399,15 +26428,20 @@
           <a:p>
             <a:r>
               <a:rPr lang="en-US" dirty="0" smtClean="0"/>
-              <a:t>Additional Info.</a:t>
+              <a:t>A similar trend unfolds here as well, </a:t>
             </a:r>
-          </a:p>
-          <a:p>
+            <a:r>
+              <a:rPr lang="en-US" dirty="0"/>
+              <a:t>the most </a:t>
+            </a:r>
             <a:r>
               <a:rPr lang="en-US" dirty="0" smtClean="0"/>
-              <a:t>box</a:t>
+              <a:t>substantial </a:t>
             </a:r>
-            <a:endParaRPr lang="en-US" dirty="0"/>
+            <a:r>
+              <a:rPr lang="en-US" dirty="0"/>
+              <a:t>accidents occurred in Cessna, followed by Piper and Beech. As such these type of brands would be best avoided. As the table has been split, I advise we proceed with the brands on the right hand side due to low incidence of occurrence.</a:t>
+            </a:r>
           </a:p>
         </p:txBody>
       </p:sp>
@@ -26501,7 +26535,7 @@
         <p:spPr>
           <a:xfrm>
             <a:off x="6937131" y="1690688"/>
-            <a:ext cx="4651131" cy="646331"/>
+            <a:ext cx="4651131" cy="3693319"/>
           </a:xfrm>
           <a:prstGeom prst="rect">
             <a:avLst/>
@@ -26515,14 +26549,60 @@
           <a:lstStyle/>
           <a:p>
             <a:r>
+              <a:rPr lang="en-US" dirty="0"/>
+              <a:t>As we can see from the graph here, </a:t>
+            </a:r>
+            <a:r>
               <a:rPr lang="en-US" dirty="0" smtClean="0"/>
-              <a:t>Additional info.</a:t>
+              <a:t>Helicopters </a:t>
+            </a:r>
+            <a:r>
+              <a:rPr lang="en-US" dirty="0"/>
+              <a:t>are relatively safe with </a:t>
+            </a:r>
+            <a:r>
+              <a:rPr lang="en-US" dirty="0" smtClean="0"/>
+              <a:t>slightly less </a:t>
+            </a:r>
+            <a:r>
+              <a:rPr lang="en-US" dirty="0"/>
+              <a:t>than </a:t>
+            </a:r>
+            <a:r>
+              <a:rPr lang="en-US" dirty="0" smtClean="0"/>
+              <a:t>25% </a:t>
+            </a:r>
+            <a:r>
+              <a:rPr lang="en-US" dirty="0"/>
+              <a:t>of fatal accidents resulting in destruction of the </a:t>
+            </a:r>
+            <a:r>
+              <a:rPr lang="en-US" dirty="0" smtClean="0"/>
+              <a:t>helicopter. </a:t>
             </a:r>
           </a:p>
           <a:p>
             <a:r>
               <a:rPr lang="en-US" dirty="0" smtClean="0"/>
-              <a:t>box</a:t>
+              <a:t>Do note; The ratio for destruction compared to substantial damage is greater in helicopters despite the fewer numbers. </a:t>
+            </a:r>
+            <a:endParaRPr lang="en-US" dirty="0"/>
+          </a:p>
+          <a:p>
+            <a:endParaRPr lang="en-US" dirty="0"/>
+          </a:p>
+          <a:p>
+            <a:r>
+              <a:rPr lang="en-US" dirty="0"/>
+              <a:t>As such, </a:t>
+            </a:r>
+            <a:r>
+              <a:rPr lang="en-US" dirty="0" smtClean="0"/>
+              <a:t>all factors held constant, helicopters seem safer than airplanes and as such we can proceed with them. We </a:t>
+            </a:r>
+            <a:r>
+              <a:rPr lang="en-US" dirty="0"/>
+              <a:t>can now proceed to delve in further to the various makes that formed the data.</a:t>
             </a:r>
             <a:endParaRPr lang="en-US" dirty="0"/>
           </a:p>
@@ -26623,14 +26703,14 @@
           <p:nvPr>
             <p:extLst>
               <p:ext uri="{D42A27DB-BD31-4B8C-83A1-F6EECF244321}">
-                <p14:modId xmlns:p14="http://schemas.microsoft.com/office/powerpoint/2010/main" val="1483352142"/>
+                <p14:modId xmlns:p14="http://schemas.microsoft.com/office/powerpoint/2010/main" val="3664189391"/>
               </p:ext>
             </p:extLst>
           </p:nvPr>
         </p:nvGraphicFramePr>
         <p:xfrm>
           <a:off x="5020407" y="1022018"/>
-          <a:ext cx="7092464" cy="3145536"/>
+          <a:ext cx="7092464" cy="3587496"/>
         </p:xfrm>
         <a:graphic>
           <a:graphicData uri="http://schemas.openxmlformats.org/drawingml/2006/table">
@@ -28707,12 +28787,12 @@
                         </a:spcAft>
                       </a:pPr>
                       <a:r>
-                        <a:rPr lang="en-US" sz="1000">
+                        <a:rPr lang="en-US" sz="1000" dirty="0">
                           <a:effectLst/>
                         </a:rPr>
                         <a:t>6</a:t>
                       </a:r>
-                      <a:endParaRPr lang="en-US" sz="1000">
+                      <a:endParaRPr lang="en-US" sz="1000" dirty="0">
                         <a:effectLst/>
                         <a:latin typeface="Calibri" panose="020F0502020204030204" pitchFamily="34" charset="0"/>
                         <a:ea typeface="Calibri" panose="020F0502020204030204" pitchFamily="34" charset="0"/>
@@ -28850,12 +28930,12 @@
                         </a:spcAft>
                       </a:pPr>
                       <a:r>
-                        <a:rPr lang="en-US" sz="1000">
+                        <a:rPr lang="en-US" sz="1000" dirty="0">
                           <a:effectLst/>
                         </a:rPr>
                         <a:t>6</a:t>
                       </a:r>
-                      <a:endParaRPr lang="en-US" sz="1000">
+                      <a:endParaRPr lang="en-US" sz="1000" dirty="0">
                         <a:effectLst/>
                         <a:latin typeface="Calibri" panose="020F0502020204030204" pitchFamily="34" charset="0"/>
                         <a:ea typeface="Calibri" panose="020F0502020204030204" pitchFamily="34" charset="0"/>
@@ -28942,14 +29022,14 @@
       </p:graphicFrame>
       <p:sp>
         <p:nvSpPr>
-          <p:cNvPr id="6" name="TextBox 5"/>
+          <p:cNvPr id="3" name="TextBox 2"/>
           <p:cNvSpPr txBox="1"/>
           <p:nvPr/>
         </p:nvSpPr>
         <p:spPr>
           <a:xfrm>
-            <a:off x="5020407" y="4167554"/>
-            <a:ext cx="7033847" cy="646331"/>
+            <a:off x="5134708" y="4809392"/>
+            <a:ext cx="6963507" cy="1477328"/>
           </a:xfrm>
           <a:prstGeom prst="rect">
             <a:avLst/>
@@ -28964,14 +29044,35 @@
           <a:p>
             <a:r>
               <a:rPr lang="en-US" dirty="0" smtClean="0"/>
-              <a:t>Additional info.</a:t>
+              <a:t>The worst </a:t>
             </a:r>
+            <a:r>
+              <a:rPr lang="en-US" dirty="0"/>
+              <a:t>accidents occurred in </a:t>
+            </a:r>
+            <a:r>
+              <a:rPr lang="en-US" dirty="0" smtClean="0"/>
+              <a:t>Bell, </a:t>
+            </a:r>
+            <a:r>
+              <a:rPr lang="en-US" dirty="0"/>
+              <a:t>followed by </a:t>
+            </a:r>
+            <a:r>
+              <a:rPr lang="en-US" dirty="0" smtClean="0"/>
+              <a:t>Robinson. </a:t>
+            </a:r>
+            <a:r>
+              <a:rPr lang="en-US" dirty="0"/>
+              <a:t>As such these type of brands would be best avoided. </a:t>
+            </a:r>
+            <a:r>
+              <a:rPr lang="en-US" dirty="0" smtClean="0"/>
+              <a:t>The data also shrank greatly in terms of incidence and as such, any brand on the table would be good save for the above two mentioned.</a:t>
+            </a:r>
+            <a:endParaRPr lang="en-US" dirty="0"/>
           </a:p>
           <a:p>
-            <a:r>
-              <a:rPr lang="en-US" dirty="0" smtClean="0"/>
-              <a:t>Box.</a:t>
-            </a:r>
             <a:endParaRPr lang="en-US" dirty="0"/>
           </a:p>
         </p:txBody>
@@ -29078,7 +29179,7 @@
         </p:nvGraphicFramePr>
         <p:xfrm>
           <a:off x="5075790" y="1113451"/>
-          <a:ext cx="6864165" cy="2938251"/>
+          <a:ext cx="6864165" cy="3283565"/>
         </p:xfrm>
         <a:graphic>
           <a:graphicData uri="http://schemas.openxmlformats.org/drawingml/2006/table">
@@ -31718,8 +31819,8 @@
         </p:nvSpPr>
         <p:spPr>
           <a:xfrm>
-            <a:off x="5075790" y="4158762"/>
-            <a:ext cx="6864165" cy="646331"/>
+            <a:off x="5075790" y="4397016"/>
+            <a:ext cx="6864165" cy="1200329"/>
           </a:xfrm>
           <a:prstGeom prst="rect">
             <a:avLst/>
@@ -31734,13 +31835,13 @@
           <a:p>
             <a:r>
               <a:rPr lang="en-US" dirty="0" smtClean="0"/>
-              <a:t>Additional Info.</a:t>
+              <a:t>In terms of substantial damage, the data takes a different turn, the figures seem to normalize and as such all the brands that appear on the left seem to be a terrible choice.</a:t>
             </a:r>
           </a:p>
           <a:p>
             <a:r>
               <a:rPr lang="en-US" dirty="0" smtClean="0"/>
-              <a:t>Box.</a:t>
+              <a:t>I shall advise that we stick to those on the Right hand side.</a:t>
             </a:r>
             <a:endParaRPr lang="en-US" dirty="0"/>
           </a:p>

</xml_diff>